<commit_message>
Actualización documentos semana VI
</commit_message>
<xml_diff>
--- a/Iteración II/Presentacion semana V 26 de Septiembre.pptx
+++ b/Iteración II/Presentacion semana V 26 de Septiembre.pptx
@@ -301,7 +301,7 @@
             <a:fld id="{B61BEF0D-F0BB-DE4B-95CE-6DB70DBA9567}" type="datetimeFigureOut">
               <a:rPr lang="en-US" dirty="0"/>
               <a:pPr/>
-              <a:t>9/25/2013</a:t>
+              <a:t>9/26/2013</a:t>
             </a:fld>
             <a:endParaRPr lang="en-US" dirty="0"/>
           </a:p>
@@ -636,7 +636,7 @@
             <a:fld id="{B61BEF0D-F0BB-DE4B-95CE-6DB70DBA9567}" type="datetimeFigureOut">
               <a:rPr lang="en-US" dirty="0"/>
               <a:pPr/>
-              <a:t>9/25/2013</a:t>
+              <a:t>9/26/2013</a:t>
             </a:fld>
             <a:endParaRPr lang="en-US" dirty="0"/>
           </a:p>
@@ -1034,7 +1034,7 @@
             <a:fld id="{B61BEF0D-F0BB-DE4B-95CE-6DB70DBA9567}" type="datetimeFigureOut">
               <a:rPr lang="en-US" dirty="0"/>
               <a:pPr/>
-              <a:t>9/25/2013</a:t>
+              <a:t>9/26/2013</a:t>
             </a:fld>
             <a:endParaRPr lang="en-US" dirty="0"/>
           </a:p>
@@ -1367,7 +1367,7 @@
             <a:fld id="{B61BEF0D-F0BB-DE4B-95CE-6DB70DBA9567}" type="datetimeFigureOut">
               <a:rPr lang="en-US" dirty="0"/>
               <a:pPr/>
-              <a:t>9/25/2013</a:t>
+              <a:t>9/26/2013</a:t>
             </a:fld>
             <a:endParaRPr lang="en-US" dirty="0"/>
           </a:p>
@@ -1684,7 +1684,7 @@
             <a:fld id="{B61BEF0D-F0BB-DE4B-95CE-6DB70DBA9567}" type="datetimeFigureOut">
               <a:rPr lang="en-US" dirty="0"/>
               <a:pPr/>
-              <a:t>9/25/2013</a:t>
+              <a:t>9/26/2013</a:t>
             </a:fld>
             <a:endParaRPr lang="en-US" dirty="0"/>
           </a:p>
@@ -2077,7 +2077,7 @@
             <a:fld id="{B61BEF0D-F0BB-DE4B-95CE-6DB70DBA9567}" type="datetimeFigureOut">
               <a:rPr lang="en-US" dirty="0"/>
               <a:pPr/>
-              <a:t>9/25/2013</a:t>
+              <a:t>9/26/2013</a:t>
             </a:fld>
             <a:endParaRPr lang="en-US" dirty="0"/>
           </a:p>
@@ -2331,7 +2331,7 @@
             <a:fld id="{B61BEF0D-F0BB-DE4B-95CE-6DB70DBA9567}" type="datetimeFigureOut">
               <a:rPr lang="en-US" dirty="0"/>
               <a:pPr/>
-              <a:t>9/25/2013</a:t>
+              <a:t>9/26/2013</a:t>
             </a:fld>
             <a:endParaRPr lang="en-US" dirty="0"/>
           </a:p>
@@ -2590,7 +2590,7 @@
             <a:fld id="{B61BEF0D-F0BB-DE4B-95CE-6DB70DBA9567}" type="datetimeFigureOut">
               <a:rPr lang="en-US" dirty="0"/>
               <a:pPr/>
-              <a:t>9/25/2013</a:t>
+              <a:t>9/26/2013</a:t>
             </a:fld>
             <a:endParaRPr lang="en-US" dirty="0"/>
           </a:p>
@@ -2849,7 +2849,7 @@
             <a:fld id="{B61BEF0D-F0BB-DE4B-95CE-6DB70DBA9567}" type="datetimeFigureOut">
               <a:rPr lang="en-US" dirty="0"/>
               <a:pPr/>
-              <a:t>9/25/2013</a:t>
+              <a:t>9/26/2013</a:t>
             </a:fld>
             <a:endParaRPr lang="en-US" dirty="0"/>
           </a:p>
@@ -3175,7 +3175,7 @@
             <a:fld id="{B61BEF0D-F0BB-DE4B-95CE-6DB70DBA9567}" type="datetimeFigureOut">
               <a:rPr lang="en-US" dirty="0"/>
               <a:pPr/>
-              <a:t>9/25/2013</a:t>
+              <a:t>9/26/2013</a:t>
             </a:fld>
             <a:endParaRPr lang="en-US" dirty="0"/>
           </a:p>
@@ -3495,7 +3495,7 @@
             <a:fld id="{B61BEF0D-F0BB-DE4B-95CE-6DB70DBA9567}" type="datetimeFigureOut">
               <a:rPr lang="en-US" dirty="0"/>
               <a:pPr/>
-              <a:t>9/25/2013</a:t>
+              <a:t>9/26/2013</a:t>
             </a:fld>
             <a:endParaRPr lang="en-US" dirty="0"/>
           </a:p>
@@ -3949,7 +3949,7 @@
             <a:fld id="{B61BEF0D-F0BB-DE4B-95CE-6DB70DBA9567}" type="datetimeFigureOut">
               <a:rPr lang="en-US" dirty="0"/>
               <a:pPr/>
-              <a:t>9/25/2013</a:t>
+              <a:t>9/26/2013</a:t>
             </a:fld>
             <a:endParaRPr lang="en-US" dirty="0"/>
           </a:p>
@@ -4151,7 +4151,7 @@
             <a:fld id="{B61BEF0D-F0BB-DE4B-95CE-6DB70DBA9567}" type="datetimeFigureOut">
               <a:rPr lang="en-US" dirty="0"/>
               <a:pPr/>
-              <a:t>9/25/2013</a:t>
+              <a:t>9/26/2013</a:t>
             </a:fld>
             <a:endParaRPr lang="en-US" dirty="0"/>
           </a:p>
@@ -4325,7 +4325,7 @@
             <a:fld id="{B61BEF0D-F0BB-DE4B-95CE-6DB70DBA9567}" type="datetimeFigureOut">
               <a:rPr lang="en-US" dirty="0"/>
               <a:pPr/>
-              <a:t>9/25/2013</a:t>
+              <a:t>9/26/2013</a:t>
             </a:fld>
             <a:endParaRPr lang="en-US" dirty="0"/>
           </a:p>
@@ -4655,7 +4655,7 @@
             <a:fld id="{B61BEF0D-F0BB-DE4B-95CE-6DB70DBA9567}" type="datetimeFigureOut">
               <a:rPr lang="en-US" dirty="0"/>
               <a:pPr/>
-              <a:t>9/25/2013</a:t>
+              <a:t>9/26/2013</a:t>
             </a:fld>
             <a:endParaRPr lang="en-US" dirty="0"/>
           </a:p>
@@ -4997,7 +4997,7 @@
             <a:fld id="{B61BEF0D-F0BB-DE4B-95CE-6DB70DBA9567}" type="datetimeFigureOut">
               <a:rPr lang="en-US" dirty="0"/>
               <a:pPr/>
-              <a:t>9/25/2013</a:t>
+              <a:t>9/26/2013</a:t>
             </a:fld>
             <a:endParaRPr lang="en-US" dirty="0"/>
           </a:p>
@@ -7111,7 +7111,7 @@
             <a:fld id="{B61BEF0D-F0BB-DE4B-95CE-6DB70DBA9567}" type="datetimeFigureOut">
               <a:rPr lang="en-US" dirty="0"/>
               <a:pPr/>
-              <a:t>9/25/2013</a:t>
+              <a:t>9/26/2013</a:t>
             </a:fld>
             <a:endParaRPr lang="en-US" dirty="0"/>
           </a:p>
@@ -7792,16 +7792,7 @@
                             <a:schemeClr val="tx1"/>
                           </a:solidFill>
                         </a:rPr>
-                        <a:t>Omar Pizarro: </a:t>
-                      </a:r>
-                      <a:r>
-                        <a:rPr lang="es-CL" sz="1600" b="0" dirty="0" smtClean="0">
-                          <a:ln/>
-                          <a:solidFill>
-                            <a:schemeClr val="tx1"/>
-                          </a:solidFill>
-                        </a:rPr>
-                        <a:t>4:00</a:t>
+                        <a:t>Omar Pizarro: 4:00</a:t>
                       </a:r>
                       <a:r>
                         <a:rPr lang="es-CL" sz="1600" b="0" baseline="0" dirty="0" smtClean="0">
@@ -7812,12 +7803,6 @@
                         </a:rPr>
                         <a:t> </a:t>
                       </a:r>
-                      <a:endParaRPr lang="es-CL" sz="1600" b="0" baseline="0" dirty="0" smtClean="0">
-                        <a:ln/>
-                        <a:solidFill>
-                          <a:schemeClr val="tx1"/>
-                        </a:solidFill>
-                      </a:endParaRPr>
                     </a:p>
                     <a:p>
                       <a:pPr lvl="1"/>
@@ -7828,16 +7813,7 @@
                             <a:schemeClr val="tx1"/>
                           </a:solidFill>
                         </a:rPr>
-                        <a:t>Juan Carlos Garcés: </a:t>
-                      </a:r>
-                      <a:r>
-                        <a:rPr lang="es-CL" sz="1600" b="0" dirty="0" smtClean="0">
-                          <a:ln/>
-                          <a:solidFill>
-                            <a:schemeClr val="tx1"/>
-                          </a:solidFill>
-                        </a:rPr>
-                        <a:t>10:24</a:t>
+                        <a:t>Juan Carlos Garcés: 10:24</a:t>
                       </a:r>
                       <a:endParaRPr lang="es-CL" dirty="0"/>
                     </a:p>
@@ -8531,17 +8507,7 @@
                           <a:effectLst/>
                           <a:latin typeface="Calibri" panose="020F0502020204030204" pitchFamily="34" charset="0"/>
                         </a:rPr>
-                        <a:t>Vie </a:t>
-                      </a:r>
-                      <a:r>
-                        <a:rPr lang="es-CL" sz="1200" dirty="0" smtClean="0">
-                          <a:solidFill>
-                            <a:srgbClr val="000000"/>
-                          </a:solidFill>
-                          <a:effectLst/>
-                          <a:latin typeface="Calibri" panose="020F0502020204030204" pitchFamily="34" charset="0"/>
-                        </a:rPr>
-                        <a:t>27-09-13</a:t>
+                        <a:t>Vie 27-09-13</a:t>
                       </a:r>
                       <a:endParaRPr lang="es-CL" sz="1200" dirty="0">
                         <a:effectLst/>
@@ -8992,7 +8958,7 @@
           <p:nvPr>
             <p:extLst>
               <p:ext uri="{D42A27DB-BD31-4B8C-83A1-F6EECF244321}">
-                <p14:modId xmlns:p14="http://schemas.microsoft.com/office/powerpoint/2010/main" val="731490554"/>
+                <p14:modId xmlns:p14="http://schemas.microsoft.com/office/powerpoint/2010/main" val="653867812"/>
               </p:ext>
             </p:extLst>
           </p:nvPr>
@@ -9314,7 +9280,7 @@
                           <a:effectLst/>
                           <a:latin typeface="+mn-lt"/>
                         </a:rPr>
-                        <a:t>18</a:t>
+                        <a:t>21</a:t>
                       </a:r>
                       <a:endParaRPr lang="es-CL" sz="1050" dirty="0">
                         <a:solidFill>
@@ -9381,7 +9347,7 @@
                           <a:effectLst/>
                           <a:latin typeface="+mn-lt"/>
                         </a:rPr>
-                        <a:t>21</a:t>
+                        <a:t>22</a:t>
                       </a:r>
                       <a:endParaRPr lang="es-CL" sz="1050" dirty="0">
                         <a:solidFill>
@@ -10083,13 +10049,6 @@
                         </a:rPr>
                         <a:t>R10</a:t>
                       </a:r>
-                      <a:endParaRPr lang="es-CL" sz="1200" dirty="0" smtClean="0">
-                        <a:solidFill>
-                          <a:srgbClr val="000000"/>
-                        </a:solidFill>
-                        <a:effectLst/>
-                        <a:latin typeface="Calibri" panose="020F0502020204030204" pitchFamily="34" charset="0"/>
-                      </a:endParaRPr>
                     </a:p>
                   </a:txBody>
                   <a:tcPr marL="9525" marR="9525" marT="9525" marB="9525" anchor="ctr">
@@ -10443,13 +10402,6 @@
                         </a:rPr>
                         <a:t>14:24</a:t>
                       </a:r>
-                      <a:endParaRPr lang="es-CL" sz="1200" dirty="0" smtClean="0">
-                        <a:solidFill>
-                          <a:srgbClr val="000000"/>
-                        </a:solidFill>
-                        <a:effectLst/>
-                        <a:latin typeface="Calibri" panose="020F0502020204030204" pitchFamily="34" charset="0"/>
-                      </a:endParaRPr>
                     </a:p>
                   </a:txBody>
                   <a:tcPr marL="9525" marR="9525" marT="9525" marB="9525" anchor="ctr">
@@ -10591,15 +10543,7 @@
                   <a:srgbClr val="92D050"/>
                 </a:solidFill>
               </a:rPr>
-              <a:t>Total: </a:t>
-            </a:r>
-            <a:r>
-              <a:rPr lang="es-CL" sz="1400" b="1" dirty="0" smtClean="0">
-                <a:solidFill>
-                  <a:srgbClr val="92D050"/>
-                </a:solidFill>
-              </a:rPr>
-              <a:t>73.890</a:t>
+              <a:t>Total: 73.890</a:t>
             </a:r>
             <a:endParaRPr lang="es-CL" sz="1400" b="1" dirty="0">
               <a:solidFill>
@@ -10800,17 +10744,7 @@
                           </a:solidFill>
                           <a:effectLst/>
                         </a:rPr>
-                        <a:t> </a:t>
-                      </a:r>
-                      <a:r>
-                        <a:rPr lang="es-CL" sz="1200" b="1" cap="none" spc="0" baseline="0" dirty="0" smtClean="0">
-                          <a:ln/>
-                          <a:solidFill>
-                            <a:schemeClr val="tx1"/>
-                          </a:solidFill>
-                          <a:effectLst/>
-                        </a:rPr>
-                        <a:t>%</a:t>
+                        <a:t> %</a:t>
                       </a:r>
                       <a:endParaRPr lang="es-CL" sz="1200" b="1" cap="none" spc="0" dirty="0" smtClean="0">
                         <a:ln/>
@@ -10895,13 +10829,6 @@
                         </a:rPr>
                         <a:t>76,9%</a:t>
                       </a:r>
-                      <a:endParaRPr lang="es-CL" sz="1200" b="1" cap="none" spc="0" dirty="0" smtClean="0">
-                        <a:ln/>
-                        <a:solidFill>
-                          <a:schemeClr val="tx1"/>
-                        </a:solidFill>
-                        <a:effectLst/>
-                      </a:endParaRPr>
                     </a:p>
                   </a:txBody>
                   <a:tcPr marL="9525" marR="9525" marT="9525" marB="9525" anchor="ctr">
@@ -11083,7 +11010,83 @@
   <p:timing>
     <p:tnLst>
       <p:par>
-        <p:cTn id="1" dur="indefinite" restart="never" nodeType="tmRoot"/>
+        <p:cTn id="1" dur="indefinite" restart="never" nodeType="tmRoot">
+          <p:childTnLst>
+            <p:seq concurrent="1" nextAc="seek">
+              <p:cTn id="2" dur="indefinite" nodeType="mainSeq">
+                <p:childTnLst>
+                  <p:par>
+                    <p:cTn id="3" fill="hold">
+                      <p:stCondLst>
+                        <p:cond delay="indefinite"/>
+                      </p:stCondLst>
+                      <p:childTnLst>
+                        <p:par>
+                          <p:cTn id="4" fill="hold">
+                            <p:stCondLst>
+                              <p:cond delay="0"/>
+                            </p:stCondLst>
+                            <p:childTnLst>
+                              <p:par>
+                                <p:cTn id="5" presetID="10" presetClass="entr" presetSubtype="0" fill="hold" nodeType="clickEffect">
+                                  <p:stCondLst>
+                                    <p:cond delay="0"/>
+                                  </p:stCondLst>
+                                  <p:childTnLst>
+                                    <p:set>
+                                      <p:cBhvr>
+                                        <p:cTn id="6" dur="1" fill="hold">
+                                          <p:stCondLst>
+                                            <p:cond delay="0"/>
+                                          </p:stCondLst>
+                                        </p:cTn>
+                                        <p:tgtEl>
+                                          <p:spTgt spid="29"/>
+                                        </p:tgtEl>
+                                        <p:attrNameLst>
+                                          <p:attrName>style.visibility</p:attrName>
+                                        </p:attrNameLst>
+                                      </p:cBhvr>
+                                      <p:to>
+                                        <p:strVal val="visible"/>
+                                      </p:to>
+                                    </p:set>
+                                    <p:animEffect transition="in" filter="fade">
+                                      <p:cBhvr>
+                                        <p:cTn id="7" dur="500"/>
+                                        <p:tgtEl>
+                                          <p:spTgt spid="29"/>
+                                        </p:tgtEl>
+                                      </p:cBhvr>
+                                    </p:animEffect>
+                                  </p:childTnLst>
+                                </p:cTn>
+                              </p:par>
+                            </p:childTnLst>
+                          </p:cTn>
+                        </p:par>
+                      </p:childTnLst>
+                    </p:cTn>
+                  </p:par>
+                </p:childTnLst>
+              </p:cTn>
+              <p:prevCondLst>
+                <p:cond evt="onPrev" delay="0">
+                  <p:tgtEl>
+                    <p:sldTgt/>
+                  </p:tgtEl>
+                </p:cond>
+              </p:prevCondLst>
+              <p:nextCondLst>
+                <p:cond evt="onNext" delay="0">
+                  <p:tgtEl>
+                    <p:sldTgt/>
+                  </p:tgtEl>
+                </p:cond>
+              </p:nextCondLst>
+            </p:seq>
+          </p:childTnLst>
+        </p:cTn>
       </p:par>
     </p:tnLst>
   </p:timing>

</xml_diff>